<commit_message>
Update Lecture 1 - Computers and Programming Languages.pptx
remove course specific content
</commit_message>
<xml_diff>
--- a/Computer Science Discoveries/Lectures/Lecture 1 - Computers and Programming Languages.pptx
+++ b/Computer Science Discoveries/Lectures/Lecture 1 - Computers and Programming Languages.pptx
@@ -125,7 +125,41 @@
       </a:defRPr>
     </a:lvl9pPr>
   </p:defaultTextStyle>
+  <p:extLst>
+    <p:ext uri="{EFAFB233-063F-42B5-8137-9DF3F51BA10A}">
+      <p15:sldGuideLst xmlns:p15="http://schemas.microsoft.com/office/powerpoint/2012/main"/>
+    </p:ext>
+  </p:extLst>
 </p:presentation>
+</file>
+
+<file path=ppt/changesInfos/changesInfo1.xml><?xml version="1.0" encoding="utf-8"?>
+<pc:chgInfo xmlns:a="http://schemas.openxmlformats.org/drawingml/2006/main" xmlns:r="http://schemas.openxmlformats.org/officeDocument/2006/relationships" xmlns:ac="http://schemas.microsoft.com/office/drawing/2013/main/command" xmlns:pc="http://schemas.microsoft.com/office/powerpoint/2013/main/command">
+  <pc:docChgLst>
+    <pc:chgData name="Joshua Gross" userId="7bb6a70e-9d37-46e4-96de-748557707bd0" providerId="ADAL" clId="{D7CC163A-65A5-4C59-AC83-2C02F35230CF}"/>
+    <pc:docChg chg="modSld">
+      <pc:chgData name="Joshua Gross" userId="7bb6a70e-9d37-46e4-96de-748557707bd0" providerId="ADAL" clId="{D7CC163A-65A5-4C59-AC83-2C02F35230CF}" dt="2023-08-17T19:34:46.877" v="1" actId="5793"/>
+      <pc:docMkLst>
+        <pc:docMk/>
+      </pc:docMkLst>
+      <pc:sldChg chg="modSp">
+        <pc:chgData name="Joshua Gross" userId="7bb6a70e-9d37-46e4-96de-748557707bd0" providerId="ADAL" clId="{D7CC163A-65A5-4C59-AC83-2C02F35230CF}" dt="2023-08-17T19:34:46.877" v="1" actId="5793"/>
+        <pc:sldMkLst>
+          <pc:docMk/>
+          <pc:sldMk cId="3419807359" sldId="260"/>
+        </pc:sldMkLst>
+        <pc:spChg chg="mod">
+          <ac:chgData name="Joshua Gross" userId="7bb6a70e-9d37-46e4-96de-748557707bd0" providerId="ADAL" clId="{D7CC163A-65A5-4C59-AC83-2C02F35230CF}" dt="2023-08-17T19:34:46.877" v="1" actId="5793"/>
+          <ac:spMkLst>
+            <pc:docMk/>
+            <pc:sldMk cId="3419807359" sldId="260"/>
+            <ac:spMk id="3" creationId="{C8B68551-FB96-401A-B777-FB1F0F24EF16}"/>
+          </ac:spMkLst>
+        </pc:spChg>
+      </pc:sldChg>
+    </pc:docChg>
+  </pc:docChgLst>
+</pc:chgInfo>
 </file>
 
 <file path=ppt/slideLayouts/slideLayout1.xml><?xml version="1.0" encoding="utf-8"?>
@@ -6469,12 +6503,9 @@
             <a:endParaRPr lang="en-US" dirty="0"/>
           </a:p>
           <a:p>
-            <a:r>
-              <a:rPr lang="en-US" dirty="0"/>
-              <a:t>This course will focus on the Java programming language</a:t>
-            </a:r>
-          </a:p>
-          <a:p>
+            <a:pPr marL="0" indent="0">
+              <a:buNone/>
+            </a:pPr>
             <a:endParaRPr lang="en-US" dirty="0"/>
           </a:p>
         </p:txBody>
@@ -7743,6 +7774,15 @@
 </file>
 
 <file path=customXml/item1.xml><?xml version="1.0" encoding="utf-8"?>
+<?mso-contentType ?>
+<FormTemplates xmlns="http://schemas.microsoft.com/sharepoint/v3/contenttype/forms">
+  <Display>DocumentLibraryForm</Display>
+  <Edit>DocumentLibraryForm</Edit>
+  <New>DocumentLibraryForm</New>
+</FormTemplates>
+</file>
+
+<file path=customXml/item2.xml><?xml version="1.0" encoding="utf-8"?>
 <ct:contentTypeSchema xmlns:ct="http://schemas.microsoft.com/office/2006/metadata/contentType" xmlns:ma="http://schemas.microsoft.com/office/2006/metadata/properties/metaAttributes" ct:_="" ma:_="" ma:contentTypeName="Document" ma:contentTypeID="0x010100560B5B77A830FC46B2AE00BAF7D52A54" ma:contentTypeVersion="4" ma:contentTypeDescription="Create a new document." ma:contentTypeScope="" ma:versionID="a6ae045d93f9b832e9a7bba127d9b523">
   <xsd:schema xmlns:xsd="http://www.w3.org/2001/XMLSchema" xmlns:xs="http://www.w3.org/2001/XMLSchema" xmlns:p="http://schemas.microsoft.com/office/2006/metadata/properties" xmlns:ns3="8c07c512-1ff3-44bd-87df-82ef976e112f" targetNamespace="http://schemas.microsoft.com/office/2006/metadata/properties" ma:root="true" ma:fieldsID="6575e1ab7935dcb7372fad9d8308503b" ns3:_="">
     <xsd:import namespace="8c07c512-1ff3-44bd-87df-82ef976e112f"/>
@@ -7886,15 +7926,6 @@
 </ct:contentTypeSchema>
 </file>
 
-<file path=customXml/item2.xml><?xml version="1.0" encoding="utf-8"?>
-<?mso-contentType ?>
-<FormTemplates xmlns="http://schemas.microsoft.com/sharepoint/v3/contenttype/forms">
-  <Display>DocumentLibraryForm</Display>
-  <Edit>DocumentLibraryForm</Edit>
-  <New>DocumentLibraryForm</New>
-</FormTemplates>
-</file>
-
 <file path=customXml/item3.xml><?xml version="1.0" encoding="utf-8"?>
 <p:properties xmlns:p="http://schemas.microsoft.com/office/2006/metadata/properties" xmlns:xsi="http://www.w3.org/2001/XMLSchema-instance" xmlns:pc="http://schemas.microsoft.com/office/infopath/2007/PartnerControls">
   <documentManagement/>
@@ -7902,6 +7933,14 @@
 </file>
 
 <file path=customXml/itemProps1.xml><?xml version="1.0" encoding="utf-8"?>
+<ds:datastoreItem xmlns:ds="http://schemas.openxmlformats.org/officeDocument/2006/customXml" ds:itemID="{1D0F6E45-1E2D-4DB1-A5CB-1AD2C888EDB4}">
+  <ds:schemaRefs>
+    <ds:schemaRef ds:uri="http://schemas.microsoft.com/sharepoint/v3/contenttype/forms"/>
+  </ds:schemaRefs>
+</ds:datastoreItem>
+</file>
+
+<file path=customXml/itemProps2.xml><?xml version="1.0" encoding="utf-8"?>
 <ds:datastoreItem xmlns:ds="http://schemas.openxmlformats.org/officeDocument/2006/customXml" ds:itemID="{EB8D7954-B0B2-4D15-B3A3-29F79D4FC701}">
   <ds:schemaRefs>
     <ds:schemaRef ds:uri="http://schemas.microsoft.com/office/2006/metadata/contentType"/>
@@ -7919,26 +7958,18 @@
 </ds:datastoreItem>
 </file>
 
-<file path=customXml/itemProps2.xml><?xml version="1.0" encoding="utf-8"?>
-<ds:datastoreItem xmlns:ds="http://schemas.openxmlformats.org/officeDocument/2006/customXml" ds:itemID="{1D0F6E45-1E2D-4DB1-A5CB-1AD2C888EDB4}">
-  <ds:schemaRefs>
-    <ds:schemaRef ds:uri="http://schemas.microsoft.com/sharepoint/v3/contenttype/forms"/>
-  </ds:schemaRefs>
-</ds:datastoreItem>
-</file>
-
 <file path=customXml/itemProps3.xml><?xml version="1.0" encoding="utf-8"?>
 <ds:datastoreItem xmlns:ds="http://schemas.openxmlformats.org/officeDocument/2006/customXml" ds:itemID="{6FB99609-54AA-4373-81CB-CB7DA710E073}">
   <ds:schemaRefs>
+    <ds:schemaRef ds:uri="http://schemas.microsoft.com/office/2006/metadata/properties"/>
+    <ds:schemaRef ds:uri="8c07c512-1ff3-44bd-87df-82ef976e112f"/>
     <ds:schemaRef ds:uri="http://purl.org/dc/terms/"/>
     <ds:schemaRef ds:uri="http://schemas.openxmlformats.org/package/2006/metadata/core-properties"/>
+    <ds:schemaRef ds:uri="http://purl.org/dc/dcmitype/"/>
+    <ds:schemaRef ds:uri="http://schemas.microsoft.com/office/infopath/2007/PartnerControls"/>
     <ds:schemaRef ds:uri="http://schemas.microsoft.com/office/2006/documentManagement/types"/>
-    <ds:schemaRef ds:uri="http://schemas.microsoft.com/office/infopath/2007/PartnerControls"/>
     <ds:schemaRef ds:uri="http://purl.org/dc/elements/1.1/"/>
-    <ds:schemaRef ds:uri="http://schemas.microsoft.com/office/2006/metadata/properties"/>
-    <ds:schemaRef ds:uri="8c07c512-1ff3-44bd-87df-82ef976e112f"/>
     <ds:schemaRef ds:uri="http://www.w3.org/XML/1998/namespace"/>
-    <ds:schemaRef ds:uri="http://purl.org/dc/dcmitype/"/>
   </ds:schemaRefs>
 </ds:datastoreItem>
 </file>
</xml_diff>